<commit_message>
Update USE THIS ONE AdversarialBiasPoster.pptx
</commit_message>
<xml_diff>
--- a/USE THIS ONE AdversarialBiasPoster.pptx
+++ b/USE THIS ONE AdversarialBiasPoster.pptx
@@ -3796,6 +3796,66 @@
       </p:grpSpPr>
       <p:pic>
         <p:nvPicPr>
+          <p:cNvPr id="3" name="Picture 2" descr="A picture containing clock&#10;&#10;Description automatically generated">
+            <a:extLst>
+              <a:ext uri="{FF2B5EF4-FFF2-40B4-BE49-F238E27FC236}">
+                <a16:creationId xmlns:a16="http://schemas.microsoft.com/office/drawing/2014/main" id="{AEF4D28B-E846-4B78-8AF3-A5132F5FEC00}"/>
+              </a:ext>
+            </a:extLst>
+          </p:cNvPr>
+          <p:cNvPicPr>
+            <a:picLocks noChangeAspect="1"/>
+          </p:cNvPicPr>
+          <p:nvPr/>
+        </p:nvPicPr>
+        <p:blipFill>
+          <a:blip r:embed="rId4"/>
+          <a:stretch>
+            <a:fillRect/>
+          </a:stretch>
+        </p:blipFill>
+        <p:spPr>
+          <a:xfrm>
+            <a:off x="6070027" y="3963308"/>
+            <a:ext cx="3182990" cy="1789316"/>
+          </a:xfrm>
+          <a:prstGeom prst="rect">
+            <a:avLst/>
+          </a:prstGeom>
+        </p:spPr>
+      </p:pic>
+      <p:pic>
+        <p:nvPicPr>
+          <p:cNvPr id="9" name="Picture 8" descr="A picture containing object, clock, monitor, large&#10;&#10;Description automatically generated">
+            <a:extLst>
+              <a:ext uri="{FF2B5EF4-FFF2-40B4-BE49-F238E27FC236}">
+                <a16:creationId xmlns:a16="http://schemas.microsoft.com/office/drawing/2014/main" id="{ECA20634-4CA1-4E12-9D7B-AD1427DEBF8D}"/>
+              </a:ext>
+            </a:extLst>
+          </p:cNvPr>
+          <p:cNvPicPr>
+            <a:picLocks noChangeAspect="1"/>
+          </p:cNvPicPr>
+          <p:nvPr/>
+        </p:nvPicPr>
+        <p:blipFill>
+          <a:blip r:embed="rId5"/>
+          <a:stretch>
+            <a:fillRect/>
+          </a:stretch>
+        </p:blipFill>
+        <p:spPr>
+          <a:xfrm>
+            <a:off x="5457023" y="1701394"/>
+            <a:ext cx="4622543" cy="2072051"/>
+          </a:xfrm>
+          <a:prstGeom prst="rect">
+            <a:avLst/>
+          </a:prstGeom>
+        </p:spPr>
+      </p:pic>
+      <p:pic>
+        <p:nvPicPr>
           <p:cNvPr id="62" name="Picture 61">
             <a:extLst>
               <a:ext uri="{FF2B5EF4-FFF2-40B4-BE49-F238E27FC236}">
@@ -3809,7 +3869,7 @@
           <p:nvPr/>
         </p:nvPicPr>
         <p:blipFill>
-          <a:blip r:embed="rId4"/>
+          <a:blip r:embed="rId6"/>
           <a:stretch>
             <a:fillRect/>
           </a:stretch>
@@ -5014,12 +5074,12 @@
           <a:graphicData uri="http://schemas.openxmlformats.org/presentationml/2006/ole">
             <mc:AlternateContent xmlns:mc="http://schemas.openxmlformats.org/markup-compatibility/2006">
               <mc:Choice xmlns:v="urn:schemas-microsoft-com:vml" Requires="v">
-                <p:oleObj spid="_x0000_s5178" name="Clip" r:id="rId5" imgW="20457143" imgH="13384127" progId="MS_ClipArt_Gallery.2">
+                <p:oleObj spid="_x0000_s5180" name="Clip" r:id="rId7" imgW="20457143" imgH="13384127" progId="MS_ClipArt_Gallery.2">
                   <p:embed/>
                 </p:oleObj>
               </mc:Choice>
               <mc:Fallback>
-                <p:oleObj name="Clip" r:id="rId5" imgW="20457143" imgH="13384127" progId="MS_ClipArt_Gallery.2">
+                <p:oleObj name="Clip" r:id="rId7" imgW="20457143" imgH="13384127" progId="MS_ClipArt_Gallery.2">
                   <p:embed/>
                   <p:pic>
                     <p:nvPicPr>
@@ -5030,7 +5090,7 @@
                       <p:nvPr/>
                     </p:nvPicPr>
                     <p:blipFill>
-                      <a:blip r:embed="rId6">
+                      <a:blip r:embed="rId8">
                         <a:lum bright="88000" contrast="-34000"/>
                         <a:extLst>
                           <a:ext uri="{28A0092B-C50C-407E-A947-70E740481C1C}">
@@ -7967,7 +8027,7 @@
                 <a:avLst/>
               </a:prstGeom>
               <a:blipFill>
-                <a:blip r:embed="rId7"/>
+                <a:blip r:embed="rId9"/>
                 <a:stretch>
                   <a:fillRect b="-23052"/>
                 </a:stretch>
@@ -10032,14 +10092,14 @@
           <p:nvPr/>
         </p:nvPicPr>
         <p:blipFill rotWithShape="1">
-          <a:blip r:embed="rId8"/>
+          <a:blip r:embed="rId10"/>
           <a:srcRect t="30838"/>
           <a:stretch/>
         </p:blipFill>
         <p:spPr>
           <a:xfrm>
-            <a:off x="5772795" y="1805033"/>
-            <a:ext cx="4172505" cy="673103"/>
+            <a:off x="4980625" y="3994151"/>
+            <a:ext cx="1967082" cy="673103"/>
           </a:xfrm>
           <a:prstGeom prst="rect">
             <a:avLst/>
@@ -10061,9 +10121,9 @@
           <p:nvPr/>
         </p:nvCxnSpPr>
         <p:spPr>
-          <a:xfrm>
-            <a:off x="7756168" y="3210807"/>
-            <a:ext cx="14929" cy="1919881"/>
+          <a:xfrm flipH="1">
+            <a:off x="5120368" y="3879620"/>
+            <a:ext cx="5264605" cy="14335"/>
           </a:xfrm>
           <a:prstGeom prst="line">
             <a:avLst/>
@@ -11227,66 +11287,6 @@
           </a:p>
         </p:txBody>
       </p:sp>
-      <p:pic>
-        <p:nvPicPr>
-          <p:cNvPr id="3" name="Picture 2" descr="A picture containing clock&#10;&#10;Description automatically generated">
-            <a:extLst>
-              <a:ext uri="{FF2B5EF4-FFF2-40B4-BE49-F238E27FC236}">
-                <a16:creationId xmlns:a16="http://schemas.microsoft.com/office/drawing/2014/main" id="{AEF4D28B-E846-4B78-8AF3-A5132F5FEC00}"/>
-              </a:ext>
-            </a:extLst>
-          </p:cNvPr>
-          <p:cNvPicPr>
-            <a:picLocks noChangeAspect="1"/>
-          </p:cNvPicPr>
-          <p:nvPr/>
-        </p:nvPicPr>
-        <p:blipFill>
-          <a:blip r:embed="rId9"/>
-          <a:stretch>
-            <a:fillRect/>
-          </a:stretch>
-        </p:blipFill>
-        <p:spPr>
-          <a:xfrm>
-            <a:off x="5899242" y="3930650"/>
-            <a:ext cx="3655336" cy="1789316"/>
-          </a:xfrm>
-          <a:prstGeom prst="rect">
-            <a:avLst/>
-          </a:prstGeom>
-        </p:spPr>
-      </p:pic>
-      <p:pic>
-        <p:nvPicPr>
-          <p:cNvPr id="9" name="Picture 8" descr="A picture containing object, clock, monitor, large&#10;&#10;Description automatically generated">
-            <a:extLst>
-              <a:ext uri="{FF2B5EF4-FFF2-40B4-BE49-F238E27FC236}">
-                <a16:creationId xmlns:a16="http://schemas.microsoft.com/office/drawing/2014/main" id="{ECA20634-4CA1-4E12-9D7B-AD1427DEBF8D}"/>
-              </a:ext>
-            </a:extLst>
-          </p:cNvPr>
-          <p:cNvPicPr>
-            <a:picLocks noChangeAspect="1"/>
-          </p:cNvPicPr>
-          <p:nvPr/>
-        </p:nvPicPr>
-        <p:blipFill>
-          <a:blip r:embed="rId10"/>
-          <a:stretch>
-            <a:fillRect/>
-          </a:stretch>
-        </p:blipFill>
-        <p:spPr>
-          <a:xfrm>
-            <a:off x="5105238" y="2478136"/>
-            <a:ext cx="5243344" cy="1509636"/>
-          </a:xfrm>
-          <a:prstGeom prst="rect">
-            <a:avLst/>
-          </a:prstGeom>
-        </p:spPr>
-      </p:pic>
     </p:spTree>
   </p:cSld>
   <p:clrMapOvr>

</xml_diff>